<commit_message>
Add DOY logo Utrecht
</commit_message>
<xml_diff>
--- a/assets/theme/images/partners.pptx
+++ b/assets/theme/images/partners.pptx
@@ -112,6 +112,14 @@
 </p:presentation>
 </file>
 
+<file path=ppt/revisionInfo.xml><?xml version="1.0" encoding="utf-8"?>
+<p1510:revInfo xmlns:a="http://schemas.openxmlformats.org/drawingml/2006/main" xmlns:r="http://schemas.openxmlformats.org/officeDocument/2006/relationships" xmlns:p1510="http://schemas.microsoft.com/office/powerpoint/2015/10/main">
+  <p1510:revLst>
+    <p1510:client id="{40555E96-AA75-4F5B-80FB-19CE1CF526E8}" v="1" dt="2025-04-07T09:34:08.578"/>
+  </p1510:revLst>
+</p1510:revInfo>
+</file>
+
 <file path=ppt/changesInfos/changesInfo1.xml><?xml version="1.0" encoding="utf-8"?>
 <pc:chgInfo xmlns:a="http://schemas.openxmlformats.org/drawingml/2006/main" xmlns:r="http://schemas.openxmlformats.org/officeDocument/2006/relationships" xmlns:ac="http://schemas.microsoft.com/office/drawing/2013/main/command" xmlns:pc="http://schemas.microsoft.com/office/powerpoint/2013/main/command">
   <pc:docChgLst>
@@ -154,6 +162,214 @@
       </pc:sldChg>
     </pc:docChg>
   </pc:docChgLst>
+  <pc:docChgLst>
+    <pc:chgData name="Tim Hermans" userId="aa4e5445-ec08-405c-bb74-fa9610c003b7" providerId="ADAL" clId="{40555E96-AA75-4F5B-80FB-19CE1CF526E8}"/>
+    <pc:docChg chg="undo custSel modSld">
+      <pc:chgData name="Tim Hermans" userId="aa4e5445-ec08-405c-bb74-fa9610c003b7" providerId="ADAL" clId="{40555E96-AA75-4F5B-80FB-19CE1CF526E8}" dt="2025-04-07T09:41:34.234" v="95" actId="1035"/>
+      <pc:docMkLst>
+        <pc:docMk/>
+      </pc:docMkLst>
+      <pc:sldChg chg="addSp delSp modSp mod setBg">
+        <pc:chgData name="Tim Hermans" userId="aa4e5445-ec08-405c-bb74-fa9610c003b7" providerId="ADAL" clId="{40555E96-AA75-4F5B-80FB-19CE1CF526E8}" dt="2025-04-07T09:41:34.234" v="95" actId="1035"/>
+        <pc:sldMkLst>
+          <pc:docMk/>
+          <pc:sldMk cId="3896694812" sldId="256"/>
+        </pc:sldMkLst>
+        <pc:spChg chg="add del">
+          <ac:chgData name="Tim Hermans" userId="aa4e5445-ec08-405c-bb74-fa9610c003b7" providerId="ADAL" clId="{40555E96-AA75-4F5B-80FB-19CE1CF526E8}" dt="2025-04-07T09:34:57.781" v="28" actId="26606"/>
+          <ac:spMkLst>
+            <pc:docMk/>
+            <pc:sldMk cId="3896694812" sldId="256"/>
+            <ac:spMk id="19" creationId="{112839B5-6527-4FE1-B5CA-71D5FFC47C0E}"/>
+          </ac:spMkLst>
+        </pc:spChg>
+        <pc:spChg chg="add del">
+          <ac:chgData name="Tim Hermans" userId="aa4e5445-ec08-405c-bb74-fa9610c003b7" providerId="ADAL" clId="{40555E96-AA75-4F5B-80FB-19CE1CF526E8}" dt="2025-04-07T09:34:57.781" v="28" actId="26606"/>
+          <ac:spMkLst>
+            <pc:docMk/>
+            <pc:sldMk cId="3896694812" sldId="256"/>
+            <ac:spMk id="20" creationId="{089B37F3-721E-4809-A50E-9EE306404ED8}"/>
+          </ac:spMkLst>
+        </pc:spChg>
+        <pc:spChg chg="add del">
+          <ac:chgData name="Tim Hermans" userId="aa4e5445-ec08-405c-bb74-fa9610c003b7" providerId="ADAL" clId="{40555E96-AA75-4F5B-80FB-19CE1CF526E8}" dt="2025-04-07T09:34:57.781" v="28" actId="26606"/>
+          <ac:spMkLst>
+            <pc:docMk/>
+            <pc:sldMk cId="3896694812" sldId="256"/>
+            <ac:spMk id="21" creationId="{6F32C1A4-2AC7-48CB-9AB7-B80470C0FD23}"/>
+          </ac:spMkLst>
+        </pc:spChg>
+        <pc:spChg chg="add del">
+          <ac:chgData name="Tim Hermans" userId="aa4e5445-ec08-405c-bb74-fa9610c003b7" providerId="ADAL" clId="{40555E96-AA75-4F5B-80FB-19CE1CF526E8}" dt="2025-04-07T09:34:42.380" v="24" actId="26606"/>
+          <ac:spMkLst>
+            <pc:docMk/>
+            <pc:sldMk cId="3896694812" sldId="256"/>
+            <ac:spMk id="22" creationId="{296BB291-4ABC-48EB-A20E-B11F249FD147}"/>
+          </ac:spMkLst>
+        </pc:spChg>
+        <pc:spChg chg="add del">
+          <ac:chgData name="Tim Hermans" userId="aa4e5445-ec08-405c-bb74-fa9610c003b7" providerId="ADAL" clId="{40555E96-AA75-4F5B-80FB-19CE1CF526E8}" dt="2025-04-07T09:34:57.781" v="28" actId="26606"/>
+          <ac:spMkLst>
+            <pc:docMk/>
+            <pc:sldMk cId="3896694812" sldId="256"/>
+            <ac:spMk id="23" creationId="{BE12D8E2-6088-4997-A8C6-1794DA9E1D48}"/>
+          </ac:spMkLst>
+        </pc:spChg>
+        <pc:spChg chg="add del">
+          <ac:chgData name="Tim Hermans" userId="aa4e5445-ec08-405c-bb74-fa9610c003b7" providerId="ADAL" clId="{40555E96-AA75-4F5B-80FB-19CE1CF526E8}" dt="2025-04-07T09:34:42.380" v="24" actId="26606"/>
+          <ac:spMkLst>
+            <pc:docMk/>
+            <pc:sldMk cId="3896694812" sldId="256"/>
+            <ac:spMk id="24" creationId="{EF68680D-88C3-4223-8FF9-B7CEA07C1E90}"/>
+          </ac:spMkLst>
+        </pc:spChg>
+        <pc:spChg chg="add del">
+          <ac:chgData name="Tim Hermans" userId="aa4e5445-ec08-405c-bb74-fa9610c003b7" providerId="ADAL" clId="{40555E96-AA75-4F5B-80FB-19CE1CF526E8}" dt="2025-04-07T09:34:57.781" v="28" actId="26606"/>
+          <ac:spMkLst>
+            <pc:docMk/>
+            <pc:sldMk cId="3896694812" sldId="256"/>
+            <ac:spMk id="25" creationId="{FAF10F47-1605-47C5-AE58-9062909ADA42}"/>
+          </ac:spMkLst>
+        </pc:spChg>
+        <pc:spChg chg="add del">
+          <ac:chgData name="Tim Hermans" userId="aa4e5445-ec08-405c-bb74-fa9610c003b7" providerId="ADAL" clId="{40555E96-AA75-4F5B-80FB-19CE1CF526E8}" dt="2025-04-07T09:34:42.380" v="24" actId="26606"/>
+          <ac:spMkLst>
+            <pc:docMk/>
+            <pc:sldMk cId="3896694812" sldId="256"/>
+            <ac:spMk id="26" creationId="{1E45451A-56A1-4D57-8530-06665AB9628F}"/>
+          </ac:spMkLst>
+        </pc:spChg>
+        <pc:spChg chg="add del">
+          <ac:chgData name="Tim Hermans" userId="aa4e5445-ec08-405c-bb74-fa9610c003b7" providerId="ADAL" clId="{40555E96-AA75-4F5B-80FB-19CE1CF526E8}" dt="2025-04-07T09:35:33.186" v="30" actId="26606"/>
+          <ac:spMkLst>
+            <pc:docMk/>
+            <pc:sldMk cId="3896694812" sldId="256"/>
+            <ac:spMk id="27" creationId="{E1750109-3B91-4506-B997-0CD8E35A1488}"/>
+          </ac:spMkLst>
+        </pc:spChg>
+        <pc:spChg chg="add del">
+          <ac:chgData name="Tim Hermans" userId="aa4e5445-ec08-405c-bb74-fa9610c003b7" providerId="ADAL" clId="{40555E96-AA75-4F5B-80FB-19CE1CF526E8}" dt="2025-04-07T09:34:42.380" v="24" actId="26606"/>
+          <ac:spMkLst>
+            <pc:docMk/>
+            <pc:sldMk cId="3896694812" sldId="256"/>
+            <ac:spMk id="28" creationId="{558BA547-98A0-4003-8D14-BEC8A12577D0}"/>
+          </ac:spMkLst>
+        </pc:spChg>
+        <pc:spChg chg="add del">
+          <ac:chgData name="Tim Hermans" userId="aa4e5445-ec08-405c-bb74-fa9610c003b7" providerId="ADAL" clId="{40555E96-AA75-4F5B-80FB-19CE1CF526E8}" dt="2025-04-07T09:35:33.186" v="30" actId="26606"/>
+          <ac:spMkLst>
+            <pc:docMk/>
+            <pc:sldMk cId="3896694812" sldId="256"/>
+            <ac:spMk id="29" creationId="{E72D8D1B-59F6-4FF3-8547-9BBB6129F2FA}"/>
+          </ac:spMkLst>
+        </pc:spChg>
+        <pc:spChg chg="add del">
+          <ac:chgData name="Tim Hermans" userId="aa4e5445-ec08-405c-bb74-fa9610c003b7" providerId="ADAL" clId="{40555E96-AA75-4F5B-80FB-19CE1CF526E8}" dt="2025-04-07T09:34:42.380" v="24" actId="26606"/>
+          <ac:spMkLst>
+            <pc:docMk/>
+            <pc:sldMk cId="3896694812" sldId="256"/>
+            <ac:spMk id="30" creationId="{7C498D76-5C8E-4439-9D70-BA9F56197405}"/>
+          </ac:spMkLst>
+        </pc:spChg>
+        <pc:spChg chg="add del">
+          <ac:chgData name="Tim Hermans" userId="aa4e5445-ec08-405c-bb74-fa9610c003b7" providerId="ADAL" clId="{40555E96-AA75-4F5B-80FB-19CE1CF526E8}" dt="2025-04-07T09:35:33.186" v="30" actId="26606"/>
+          <ac:spMkLst>
+            <pc:docMk/>
+            <pc:sldMk cId="3896694812" sldId="256"/>
+            <ac:spMk id="31" creationId="{2C444748-5A8D-4B53-89FE-42B455DFA2D1}"/>
+          </ac:spMkLst>
+        </pc:spChg>
+        <pc:spChg chg="add del">
+          <ac:chgData name="Tim Hermans" userId="aa4e5445-ec08-405c-bb74-fa9610c003b7" providerId="ADAL" clId="{40555E96-AA75-4F5B-80FB-19CE1CF526E8}" dt="2025-04-07T09:34:42.380" v="24" actId="26606"/>
+          <ac:spMkLst>
+            <pc:docMk/>
+            <pc:sldMk cId="3896694812" sldId="256"/>
+            <ac:spMk id="32" creationId="{F95AC789-3AB1-41E7-BF4E-6861EF948160}"/>
+          </ac:spMkLst>
+        </pc:spChg>
+        <pc:spChg chg="add del">
+          <ac:chgData name="Tim Hermans" userId="aa4e5445-ec08-405c-bb74-fa9610c003b7" providerId="ADAL" clId="{40555E96-AA75-4F5B-80FB-19CE1CF526E8}" dt="2025-04-07T09:35:33.186" v="30" actId="26606"/>
+          <ac:spMkLst>
+            <pc:docMk/>
+            <pc:sldMk cId="3896694812" sldId="256"/>
+            <ac:spMk id="33" creationId="{14044C96-7CFD-44DB-A579-D77B0D37C681}"/>
+          </ac:spMkLst>
+        </pc:spChg>
+        <pc:spChg chg="add del">
+          <ac:chgData name="Tim Hermans" userId="aa4e5445-ec08-405c-bb74-fa9610c003b7" providerId="ADAL" clId="{40555E96-AA75-4F5B-80FB-19CE1CF526E8}" dt="2025-04-07T09:35:33.186" v="30" actId="26606"/>
+          <ac:spMkLst>
+            <pc:docMk/>
+            <pc:sldMk cId="3896694812" sldId="256"/>
+            <ac:spMk id="34" creationId="{7F9FE375-3674-4B26-B67B-30AFAF78CC57}"/>
+          </ac:spMkLst>
+        </pc:spChg>
+        <pc:spChg chg="add del">
+          <ac:chgData name="Tim Hermans" userId="aa4e5445-ec08-405c-bb74-fa9610c003b7" providerId="ADAL" clId="{40555E96-AA75-4F5B-80FB-19CE1CF526E8}" dt="2025-04-07T09:35:33.186" v="30" actId="26606"/>
+          <ac:spMkLst>
+            <pc:docMk/>
+            <pc:sldMk cId="3896694812" sldId="256"/>
+            <ac:spMk id="35" creationId="{8FC8C21F-9484-4A71-ABFA-6C10682FAC3E}"/>
+          </ac:spMkLst>
+        </pc:spChg>
+        <pc:spChg chg="add del">
+          <ac:chgData name="Tim Hermans" userId="aa4e5445-ec08-405c-bb74-fa9610c003b7" providerId="ADAL" clId="{40555E96-AA75-4F5B-80FB-19CE1CF526E8}" dt="2025-04-07T09:35:33.186" v="30" actId="26606"/>
+          <ac:spMkLst>
+            <pc:docMk/>
+            <pc:sldMk cId="3896694812" sldId="256"/>
+            <ac:spMk id="36" creationId="{F4FFA271-A10A-4AC3-8F06-E3313A197A80}"/>
+          </ac:spMkLst>
+        </pc:spChg>
+        <pc:picChg chg="add mod ord">
+          <ac:chgData name="Tim Hermans" userId="aa4e5445-ec08-405c-bb74-fa9610c003b7" providerId="ADAL" clId="{40555E96-AA75-4F5B-80FB-19CE1CF526E8}" dt="2025-04-07T09:41:34.234" v="95" actId="1035"/>
+          <ac:picMkLst>
+            <pc:docMk/>
+            <pc:sldMk cId="3896694812" sldId="256"/>
+            <ac:picMk id="3" creationId="{4C54FB1A-BCDF-9858-B29F-5C3D760D2CE6}"/>
+          </ac:picMkLst>
+        </pc:picChg>
+        <pc:picChg chg="mod ord">
+          <ac:chgData name="Tim Hermans" userId="aa4e5445-ec08-405c-bb74-fa9610c003b7" providerId="ADAL" clId="{40555E96-AA75-4F5B-80FB-19CE1CF526E8}" dt="2025-04-07T09:41:34.234" v="95" actId="1035"/>
+          <ac:picMkLst>
+            <pc:docMk/>
+            <pc:sldMk cId="3896694812" sldId="256"/>
+            <ac:picMk id="9" creationId="{81D5418F-2403-55F6-1C0C-1443F3E056EB}"/>
+          </ac:picMkLst>
+        </pc:picChg>
+        <pc:picChg chg="mod ord">
+          <ac:chgData name="Tim Hermans" userId="aa4e5445-ec08-405c-bb74-fa9610c003b7" providerId="ADAL" clId="{40555E96-AA75-4F5B-80FB-19CE1CF526E8}" dt="2025-04-07T09:41:34.234" v="95" actId="1035"/>
+          <ac:picMkLst>
+            <pc:docMk/>
+            <pc:sldMk cId="3896694812" sldId="256"/>
+            <ac:picMk id="11" creationId="{2E50160F-E45F-EA08-79E8-CAFD225ABCCB}"/>
+          </ac:picMkLst>
+        </pc:picChg>
+        <pc:picChg chg="mod ord">
+          <ac:chgData name="Tim Hermans" userId="aa4e5445-ec08-405c-bb74-fa9610c003b7" providerId="ADAL" clId="{40555E96-AA75-4F5B-80FB-19CE1CF526E8}" dt="2025-04-07T09:41:34.234" v="95" actId="1035"/>
+          <ac:picMkLst>
+            <pc:docMk/>
+            <pc:sldMk cId="3896694812" sldId="256"/>
+            <ac:picMk id="13" creationId="{E6549FB5-FCA1-393F-9C5B-17FC6DDC280A}"/>
+          </ac:picMkLst>
+        </pc:picChg>
+        <pc:picChg chg="mod ord">
+          <ac:chgData name="Tim Hermans" userId="aa4e5445-ec08-405c-bb74-fa9610c003b7" providerId="ADAL" clId="{40555E96-AA75-4F5B-80FB-19CE1CF526E8}" dt="2025-04-07T09:41:34.234" v="95" actId="1035"/>
+          <ac:picMkLst>
+            <pc:docMk/>
+            <pc:sldMk cId="3896694812" sldId="256"/>
+            <ac:picMk id="15" creationId="{C7957B5D-FFD7-6EF1-D56E-40F0B349CA94}"/>
+          </ac:picMkLst>
+        </pc:picChg>
+        <pc:picChg chg="mod">
+          <ac:chgData name="Tim Hermans" userId="aa4e5445-ec08-405c-bb74-fa9610c003b7" providerId="ADAL" clId="{40555E96-AA75-4F5B-80FB-19CE1CF526E8}" dt="2025-04-07T09:41:34.234" v="95" actId="1035"/>
+          <ac:picMkLst>
+            <pc:docMk/>
+            <pc:sldMk cId="3896694812" sldId="256"/>
+            <ac:picMk id="17" creationId="{C3DF015E-2BD7-B845-7F15-932B351BC512}"/>
+          </ac:picMkLst>
+        </pc:picChg>
+      </pc:sldChg>
+    </pc:docChg>
+  </pc:docChgLst>
 </pc:chgInfo>
 </file>
 
@@ -306,7 +522,7 @@
           <a:p>
             <a:fld id="{5CB11163-71F1-4E93-ABF1-476E36FD3511}" type="datetimeFigureOut">
               <a:rPr lang="en-US" smtClean="0"/>
-              <a:t>1/29/2025</a:t>
+              <a:t>4/7/2025</a:t>
             </a:fld>
             <a:endParaRPr lang="en-US"/>
           </a:p>
@@ -506,7 +722,7 @@
           <a:p>
             <a:fld id="{5CB11163-71F1-4E93-ABF1-476E36FD3511}" type="datetimeFigureOut">
               <a:rPr lang="en-US" smtClean="0"/>
-              <a:t>1/29/2025</a:t>
+              <a:t>4/7/2025</a:t>
             </a:fld>
             <a:endParaRPr lang="en-US"/>
           </a:p>
@@ -716,7 +932,7 @@
           <a:p>
             <a:fld id="{5CB11163-71F1-4E93-ABF1-476E36FD3511}" type="datetimeFigureOut">
               <a:rPr lang="en-US" smtClean="0"/>
-              <a:t>1/29/2025</a:t>
+              <a:t>4/7/2025</a:t>
             </a:fld>
             <a:endParaRPr lang="en-US"/>
           </a:p>
@@ -916,7 +1132,7 @@
           <a:p>
             <a:fld id="{5CB11163-71F1-4E93-ABF1-476E36FD3511}" type="datetimeFigureOut">
               <a:rPr lang="en-US" smtClean="0"/>
-              <a:t>1/29/2025</a:t>
+              <a:t>4/7/2025</a:t>
             </a:fld>
             <a:endParaRPr lang="en-US"/>
           </a:p>
@@ -1192,7 +1408,7 @@
           <a:p>
             <a:fld id="{5CB11163-71F1-4E93-ABF1-476E36FD3511}" type="datetimeFigureOut">
               <a:rPr lang="en-US" smtClean="0"/>
-              <a:t>1/29/2025</a:t>
+              <a:t>4/7/2025</a:t>
             </a:fld>
             <a:endParaRPr lang="en-US"/>
           </a:p>
@@ -1460,7 +1676,7 @@
           <a:p>
             <a:fld id="{5CB11163-71F1-4E93-ABF1-476E36FD3511}" type="datetimeFigureOut">
               <a:rPr lang="en-US" smtClean="0"/>
-              <a:t>1/29/2025</a:t>
+              <a:t>4/7/2025</a:t>
             </a:fld>
             <a:endParaRPr lang="en-US"/>
           </a:p>
@@ -1875,7 +2091,7 @@
           <a:p>
             <a:fld id="{5CB11163-71F1-4E93-ABF1-476E36FD3511}" type="datetimeFigureOut">
               <a:rPr lang="en-US" smtClean="0"/>
-              <a:t>1/29/2025</a:t>
+              <a:t>4/7/2025</a:t>
             </a:fld>
             <a:endParaRPr lang="en-US"/>
           </a:p>
@@ -2017,7 +2233,7 @@
           <a:p>
             <a:fld id="{5CB11163-71F1-4E93-ABF1-476E36FD3511}" type="datetimeFigureOut">
               <a:rPr lang="en-US" smtClean="0"/>
-              <a:t>1/29/2025</a:t>
+              <a:t>4/7/2025</a:t>
             </a:fld>
             <a:endParaRPr lang="en-US"/>
           </a:p>
@@ -2130,7 +2346,7 @@
           <a:p>
             <a:fld id="{5CB11163-71F1-4E93-ABF1-476E36FD3511}" type="datetimeFigureOut">
               <a:rPr lang="en-US" smtClean="0"/>
-              <a:t>1/29/2025</a:t>
+              <a:t>4/7/2025</a:t>
             </a:fld>
             <a:endParaRPr lang="en-US"/>
           </a:p>
@@ -2443,7 +2659,7 @@
           <a:p>
             <a:fld id="{5CB11163-71F1-4E93-ABF1-476E36FD3511}" type="datetimeFigureOut">
               <a:rPr lang="en-US" smtClean="0"/>
-              <a:t>1/29/2025</a:t>
+              <a:t>4/7/2025</a:t>
             </a:fld>
             <a:endParaRPr lang="en-US"/>
           </a:p>
@@ -2732,7 +2948,7 @@
           <a:p>
             <a:fld id="{5CB11163-71F1-4E93-ABF1-476E36FD3511}" type="datetimeFigureOut">
               <a:rPr lang="en-US" smtClean="0"/>
-              <a:t>1/29/2025</a:t>
+              <a:t>4/7/2025</a:t>
             </a:fld>
             <a:endParaRPr lang="en-US"/>
           </a:p>
@@ -2975,7 +3191,7 @@
           <a:p>
             <a:fld id="{5CB11163-71F1-4E93-ABF1-476E36FD3511}" type="datetimeFigureOut">
               <a:rPr lang="en-US" smtClean="0"/>
-              <a:t>1/29/2025</a:t>
+              <a:t>4/7/2025</a:t>
             </a:fld>
             <a:endParaRPr lang="en-US"/>
           </a:p>
@@ -3378,6 +3594,14 @@
 <file path=ppt/slides/slide1.xml><?xml version="1.0" encoding="utf-8"?>
 <p:sld xmlns:a="http://schemas.openxmlformats.org/drawingml/2006/main" xmlns:r="http://schemas.openxmlformats.org/officeDocument/2006/relationships" xmlns:p="http://schemas.openxmlformats.org/presentationml/2006/main">
   <p:cSld>
+    <p:bg>
+      <p:bgPr>
+        <a:solidFill>
+          <a:schemeClr val="bg1"/>
+        </a:solidFill>
+        <a:effectLst/>
+      </p:bgPr>
+    </p:bg>
     <p:spTree>
       <p:nvGrpSpPr>
         <p:cNvPr id="1" name=""/>
@@ -3394,10 +3618,10 @@
       </p:grpSpPr>
       <p:pic>
         <p:nvPicPr>
-          <p:cNvPr id="9" name="Afbeelding 8" descr="Afbeelding met Graphics, Lettertype, grafische vormgeving, logo&#10;&#10;Automatisch gegenereerde beschrijving">
-            <a:extLst>
-              <a:ext uri="{FF2B5EF4-FFF2-40B4-BE49-F238E27FC236}">
-                <a16:creationId xmlns:a16="http://schemas.microsoft.com/office/drawing/2014/main" id="{81D5418F-2403-55F6-1C0C-1443F3E056EB}"/>
+          <p:cNvPr id="17" name="Afbeelding 16" descr="Afbeelding met Graphics, Lettertype, grafische vormgeving, schermopname&#10;&#10;Automatisch gegenereerde beschrijving">
+            <a:extLst>
+              <a:ext uri="{FF2B5EF4-FFF2-40B4-BE49-F238E27FC236}">
+                <a16:creationId xmlns:a16="http://schemas.microsoft.com/office/drawing/2014/main" id="{C3DF015E-2BD7-B845-7F15-932B351BC512}"/>
               </a:ext>
             </a:extLst>
           </p:cNvPr>
@@ -3420,8 +3644,44 @@
         </p:blipFill>
         <p:spPr>
           <a:xfrm>
-            <a:off x="160257" y="3225699"/>
-            <a:ext cx="2826083" cy="2010759"/>
+            <a:off x="4020749" y="1580063"/>
+            <a:ext cx="3785129" cy="1487796"/>
+          </a:xfrm>
+          <a:prstGeom prst="rect">
+            <a:avLst/>
+          </a:prstGeom>
+        </p:spPr>
+      </p:pic>
+      <p:pic>
+        <p:nvPicPr>
+          <p:cNvPr id="3" name="Afbeelding 2" descr="Afbeelding met tekst, geel, Graphics, grafische vormgeving&#10;&#10;Door AI gegenereerde inhoud is mogelijk onjuist.">
+            <a:extLst>
+              <a:ext uri="{FF2B5EF4-FFF2-40B4-BE49-F238E27FC236}">
+                <a16:creationId xmlns:a16="http://schemas.microsoft.com/office/drawing/2014/main" id="{4C54FB1A-BCDF-9858-B29F-5C3D760D2CE6}"/>
+              </a:ext>
+            </a:extLst>
+          </p:cNvPr>
+          <p:cNvPicPr>
+            <a:picLocks noChangeAspect="1"/>
+          </p:cNvPicPr>
+          <p:nvPr/>
+        </p:nvPicPr>
+        <p:blipFill>
+          <a:blip r:embed="rId3">
+            <a:extLst>
+              <a:ext uri="{28A0092B-C50C-407E-A947-70E740481C1C}">
+                <a14:useLocalDpi xmlns:a14="http://schemas.microsoft.com/office/drawing/2010/main" val="0"/>
+              </a:ext>
+            </a:extLst>
+          </a:blip>
+          <a:stretch>
+            <a:fillRect/>
+          </a:stretch>
+        </p:blipFill>
+        <p:spPr>
+          <a:xfrm>
+            <a:off x="7914269" y="1941109"/>
+            <a:ext cx="4107733" cy="821546"/>
           </a:xfrm>
           <a:prstGeom prst="rect">
             <a:avLst/>
@@ -3443,10 +3703,10 @@
           <p:nvPr/>
         </p:nvPicPr>
         <p:blipFill>
-          <a:blip r:embed="rId3">
+          <a:blip r:embed="rId4">
             <a:extLst>
               <a:ext uri="{96DAC541-7B7A-43D3-8B79-37D633B846F1}">
-                <asvg:svgBlip xmlns:asvg="http://schemas.microsoft.com/office/drawing/2016/SVG/main" r:embed="rId4"/>
+                <asvg:svgBlip xmlns:asvg="http://schemas.microsoft.com/office/drawing/2016/SVG/main" r:embed="rId5"/>
               </a:ext>
             </a:extLst>
           </a:blip>
@@ -3456,8 +3716,44 @@
         </p:blipFill>
         <p:spPr>
           <a:xfrm>
-            <a:off x="3478576" y="3635237"/>
-            <a:ext cx="3858535" cy="1593129"/>
+            <a:off x="4258424" y="4082287"/>
+            <a:ext cx="3239769" cy="1337649"/>
+          </a:xfrm>
+          <a:prstGeom prst="rect">
+            <a:avLst/>
+          </a:prstGeom>
+        </p:spPr>
+      </p:pic>
+      <p:pic>
+        <p:nvPicPr>
+          <p:cNvPr id="15" name="Afbeelding 14" descr="Afbeelding met tekst, schermopname, Lettertype, Elektrisch blauw&#10;&#10;Automatisch gegenereerde beschrijving">
+            <a:extLst>
+              <a:ext uri="{FF2B5EF4-FFF2-40B4-BE49-F238E27FC236}">
+                <a16:creationId xmlns:a16="http://schemas.microsoft.com/office/drawing/2014/main" id="{C7957B5D-FFD7-6EF1-D56E-40F0B349CA94}"/>
+              </a:ext>
+            </a:extLst>
+          </p:cNvPr>
+          <p:cNvPicPr>
+            <a:picLocks noChangeAspect="1"/>
+          </p:cNvPicPr>
+          <p:nvPr/>
+        </p:nvPicPr>
+        <p:blipFill>
+          <a:blip r:embed="rId6">
+            <a:extLst>
+              <a:ext uri="{28A0092B-C50C-407E-A947-70E740481C1C}">
+                <a14:useLocalDpi xmlns:a14="http://schemas.microsoft.com/office/drawing/2010/main" val="0"/>
+              </a:ext>
+            </a:extLst>
+          </a:blip>
+          <a:stretch>
+            <a:fillRect/>
+          </a:stretch>
+        </p:blipFill>
+        <p:spPr>
+          <a:xfrm>
+            <a:off x="549109" y="1769841"/>
+            <a:ext cx="3059853" cy="1101546"/>
           </a:xfrm>
           <a:prstGeom prst="rect">
             <a:avLst/>
@@ -3479,7 +3775,7 @@
           <p:nvPr/>
         </p:nvPicPr>
         <p:blipFill>
-          <a:blip r:embed="rId5">
+          <a:blip r:embed="rId7">
             <a:extLst>
               <a:ext uri="{28A0092B-C50C-407E-A947-70E740481C1C}">
                 <a14:useLocalDpi xmlns:a14="http://schemas.microsoft.com/office/drawing/2010/main" val="0"/>
@@ -3492,8 +3788,8 @@
         </p:blipFill>
         <p:spPr>
           <a:xfrm>
-            <a:off x="6991676" y="3562233"/>
-            <a:ext cx="5603634" cy="1528025"/>
+            <a:off x="7805878" y="4161498"/>
+            <a:ext cx="4324513" cy="1179228"/>
           </a:xfrm>
           <a:prstGeom prst="rect">
             <a:avLst/>
@@ -3502,10 +3798,10 @@
       </p:pic>
       <p:pic>
         <p:nvPicPr>
-          <p:cNvPr id="15" name="Afbeelding 14" descr="Afbeelding met tekst, schermopname, Lettertype, Elektrisch blauw&#10;&#10;Automatisch gegenereerde beschrijving">
-            <a:extLst>
-              <a:ext uri="{FF2B5EF4-FFF2-40B4-BE49-F238E27FC236}">
-                <a16:creationId xmlns:a16="http://schemas.microsoft.com/office/drawing/2014/main" id="{C7957B5D-FFD7-6EF1-D56E-40F0B349CA94}"/>
+          <p:cNvPr id="9" name="Afbeelding 8" descr="Afbeelding met Graphics, Lettertype, grafische vormgeving, logo&#10;&#10;Automatisch gegenereerde beschrijving">
+            <a:extLst>
+              <a:ext uri="{FF2B5EF4-FFF2-40B4-BE49-F238E27FC236}">
+                <a16:creationId xmlns:a16="http://schemas.microsoft.com/office/drawing/2014/main" id="{81D5418F-2403-55F6-1C0C-1443F3E056EB}"/>
               </a:ext>
             </a:extLst>
           </p:cNvPr>
@@ -3515,7 +3811,7 @@
           <p:nvPr/>
         </p:nvPicPr>
         <p:blipFill>
-          <a:blip r:embed="rId6">
+          <a:blip r:embed="rId8">
             <a:extLst>
               <a:ext uri="{28A0092B-C50C-407E-A947-70E740481C1C}">
                 <a14:useLocalDpi xmlns:a14="http://schemas.microsoft.com/office/drawing/2010/main" val="0"/>
@@ -3528,44 +3824,8 @@
         </p:blipFill>
         <p:spPr>
           <a:xfrm>
-            <a:off x="952276" y="1433562"/>
-            <a:ext cx="3893270" cy="1405227"/>
-          </a:xfrm>
-          <a:prstGeom prst="rect">
-            <a:avLst/>
-          </a:prstGeom>
-        </p:spPr>
-      </p:pic>
-      <p:pic>
-        <p:nvPicPr>
-          <p:cNvPr id="17" name="Afbeelding 16" descr="Afbeelding met Graphics, Lettertype, grafische vormgeving, schermopname&#10;&#10;Automatisch gegenereerde beschrijving">
-            <a:extLst>
-              <a:ext uri="{FF2B5EF4-FFF2-40B4-BE49-F238E27FC236}">
-                <a16:creationId xmlns:a16="http://schemas.microsoft.com/office/drawing/2014/main" id="{C3DF015E-2BD7-B845-7F15-932B351BC512}"/>
-              </a:ext>
-            </a:extLst>
-          </p:cNvPr>
-          <p:cNvPicPr>
-            <a:picLocks noChangeAspect="1"/>
-          </p:cNvPicPr>
-          <p:nvPr/>
-        </p:nvPicPr>
-        <p:blipFill>
-          <a:blip r:embed="rId7">
-            <a:extLst>
-              <a:ext uri="{28A0092B-C50C-407E-A947-70E740481C1C}">
-                <a14:useLocalDpi xmlns:a14="http://schemas.microsoft.com/office/drawing/2010/main" val="0"/>
-              </a:ext>
-            </a:extLst>
-          </a:blip>
-          <a:stretch>
-            <a:fillRect/>
-          </a:stretch>
-        </p:blipFill>
-        <p:spPr>
-          <a:xfrm>
-            <a:off x="5407844" y="938117"/>
-            <a:ext cx="6095999" cy="2396115"/>
+            <a:off x="451832" y="3341451"/>
+            <a:ext cx="3239769" cy="2308335"/>
           </a:xfrm>
           <a:prstGeom prst="rect">
             <a:avLst/>

</xml_diff>